<commit_message>
Text adjustment in Stat 602 midterm
</commit_message>
<xml_diff>
--- a/R/STAT 602 - Applied Statistics II/Classification Project Seeds/Midterm Project - Gavin Gunawardena.pptx
+++ b/R/STAT 602 - Applied Statistics II/Classification Project Seeds/Midterm Project - Gavin Gunawardena.pptx
@@ -5508,7 +5508,15 @@
             <a:pPr lvl="1"/>
             <a:r>
               <a:rPr lang="en-US" dirty="0"/>
-              <a:t>For each possible count of features, 1 thru 7, each were iteratively tested for their ability to accurately predict seed classes</a:t>
+              <a:t>For each possible count of features, 1 thru 7, each were iteratively tested for their ability to accurately </a:t>
+            </a:r>
+            <a:r>
+              <a:rPr lang="en-US"/>
+              <a:t>predict bean </a:t>
+            </a:r>
+            <a:r>
+              <a:rPr lang="en-US" dirty="0"/>
+              <a:t>classes</a:t>
             </a:r>
           </a:p>
           <a:p>

</xml_diff>

<commit_message>
Updates and modifications to STAT 602 bean classification project.
</commit_message>
<xml_diff>
--- a/R/STAT 602 - Applied Statistics II/Classification Project Seeds/Midterm Project - Gavin Gunawardena.pptx
+++ b/R/STAT 602 - Applied Statistics II/Classification Project Seeds/Midterm Project - Gavin Gunawardena.pptx
@@ -214,7 +214,7 @@
           <a:p>
             <a:fld id="{71BD4573-58E7-4156-A133-2731F5F8D1A6}" type="datetimeFigureOut">
               <a:rPr lang="en-US" smtClean="0"/>
-              <a:t>7/18/2022</a:t>
+              <a:t>8/12/2022</a:t>
             </a:fld>
             <a:endParaRPr lang="en-US"/>
           </a:p>
@@ -879,7 +879,7 @@
           <a:p>
             <a:fld id="{021A1D30-C0A0-4124-A783-34D9F15FA0FE}" type="datetime1">
               <a:rPr lang="en-US" smtClean="0"/>
-              <a:t>7/18/2022</a:t>
+              <a:t>8/12/2022</a:t>
             </a:fld>
             <a:endParaRPr lang="en-US"/>
           </a:p>
@@ -1063,7 +1063,7 @@
           <a:p>
             <a:fld id="{8D2D5871-AB0F-4B3D-8861-97E78CB7B47E}" type="datetime1">
               <a:rPr lang="en-US" smtClean="0"/>
-              <a:t>7/18/2022</a:t>
+              <a:t>8/12/2022</a:t>
             </a:fld>
             <a:endParaRPr lang="en-US"/>
           </a:p>
@@ -1257,7 +1257,7 @@
           <a:p>
             <a:fld id="{14418406-4C3F-4F3E-80BD-A22568EA37EB}" type="datetime1">
               <a:rPr lang="en-US" smtClean="0"/>
-              <a:t>7/18/2022</a:t>
+              <a:t>8/12/2022</a:t>
             </a:fld>
             <a:endParaRPr lang="en-US"/>
           </a:p>
@@ -1441,7 +1441,7 @@
           <a:p>
             <a:fld id="{65F28077-7188-48C5-8679-2287FAC952E9}" type="datetime1">
               <a:rPr lang="en-US" smtClean="0"/>
-              <a:t>7/18/2022</a:t>
+              <a:t>8/12/2022</a:t>
             </a:fld>
             <a:endParaRPr lang="en-US"/>
           </a:p>
@@ -1688,7 +1688,7 @@
           <a:p>
             <a:fld id="{D2DCB740-6776-4EE9-99FD-96D592FA5A23}" type="datetime1">
               <a:rPr lang="en-US" smtClean="0"/>
-              <a:t>7/18/2022</a:t>
+              <a:t>8/12/2022</a:t>
             </a:fld>
             <a:endParaRPr lang="en-US"/>
           </a:p>
@@ -1971,7 +1971,7 @@
           <a:p>
             <a:fld id="{05F6BD99-6FFD-46C5-B5E2-43A34BDA2566}" type="datetime1">
               <a:rPr lang="en-US" smtClean="0"/>
-              <a:t>7/18/2022</a:t>
+              <a:t>8/12/2022</a:t>
             </a:fld>
             <a:endParaRPr lang="en-US"/>
           </a:p>
@@ -2368,7 +2368,7 @@
           <a:p>
             <a:fld id="{E022678E-214C-4CF8-97C7-95015FB02960}" type="datetime1">
               <a:rPr lang="en-US" smtClean="0"/>
-              <a:t>7/18/2022</a:t>
+              <a:t>8/12/2022</a:t>
             </a:fld>
             <a:endParaRPr lang="en-US"/>
           </a:p>
@@ -2537,7 +2537,7 @@
           <a:p>
             <a:fld id="{D55660E0-FA77-4473-A859-74127B089143}" type="datetime1">
               <a:rPr lang="en-US" smtClean="0"/>
-              <a:t>7/18/2022</a:t>
+              <a:t>8/12/2022</a:t>
             </a:fld>
             <a:endParaRPr lang="en-US"/>
           </a:p>
@@ -2647,7 +2647,7 @@
           <a:p>
             <a:fld id="{3188D7B8-9F07-4899-827D-5F3CFDDEB574}" type="datetime1">
               <a:rPr lang="en-US" smtClean="0"/>
-              <a:t>7/18/2022</a:t>
+              <a:t>8/12/2022</a:t>
             </a:fld>
             <a:endParaRPr lang="en-US"/>
           </a:p>
@@ -2927,7 +2927,7 @@
           <a:p>
             <a:fld id="{B5197C5C-1CD1-417D-A89C-14747F5222C7}" type="datetime1">
               <a:rPr lang="en-US" smtClean="0"/>
-              <a:t>7/18/2022</a:t>
+              <a:t>8/12/2022</a:t>
             </a:fld>
             <a:endParaRPr lang="en-US"/>
           </a:p>
@@ -3280,7 +3280,7 @@
           <a:p>
             <a:fld id="{1359EFBB-CFA1-4AA8-9123-F0B52DBD84FE}" type="datetime1">
               <a:rPr lang="en-US" smtClean="0"/>
-              <a:t>7/18/2022</a:t>
+              <a:t>8/12/2022</a:t>
             </a:fld>
             <a:endParaRPr lang="en-US"/>
           </a:p>
@@ -4314,7 +4314,7 @@
             <a:fld id="{61146459-E3C3-4969-9224-5ED50B492D17}" type="datetime1">
               <a:rPr lang="en-US" smtClean="0"/>
               <a:pPr/>
-              <a:t>7/18/2022</a:t>
+              <a:t>8/12/2022</a:t>
             </a:fld>
             <a:endParaRPr lang="en-US" dirty="0"/>
           </a:p>
@@ -5508,22 +5508,14 @@
             <a:pPr lvl="1"/>
             <a:r>
               <a:rPr lang="en-US" dirty="0"/>
-              <a:t>For each possible count of features, 1 thru 7, each were iteratively tested for their ability to accurately </a:t>
-            </a:r>
-            <a:r>
-              <a:rPr lang="en-US"/>
-              <a:t>predict bean </a:t>
-            </a:r>
+              <a:t>For each possible count of features, 1 thru 7, each were iteratively tested for their ability to accurately predict bean classes</a:t>
+            </a:r>
+          </a:p>
+          <a:p>
+            <a:pPr lvl="1"/>
             <a:r>
               <a:rPr lang="en-US" dirty="0"/>
-              <a:t>classes</a:t>
-            </a:r>
-          </a:p>
-          <a:p>
-            <a:pPr lvl="1"/>
-            <a:r>
-              <a:rPr lang="en-US" dirty="0"/>
-              <a:t>The set with 4 features was chosen as it had the highest adjusted R^2 score</a:t>
+              <a:t>The set with 5 features was chosen as it had the highest adjusted R^2 score</a:t>
             </a:r>
           </a:p>
           <a:p>
@@ -5532,12 +5524,52 @@
           </a:p>
         </p:txBody>
       </p:sp>
+      <p:sp>
+        <p:nvSpPr>
+          <p:cNvPr id="6" name="TextBox 5">
+            <a:extLst>
+              <a:ext uri="{FF2B5EF4-FFF2-40B4-BE49-F238E27FC236}">
+                <a16:creationId xmlns:a16="http://schemas.microsoft.com/office/drawing/2014/main" id="{1B2C1D97-D2F1-B0DA-0C91-2B50CEBB1BBA}"/>
+              </a:ext>
+            </a:extLst>
+          </p:cNvPr>
+          <p:cNvSpPr txBox="1"/>
+          <p:nvPr/>
+        </p:nvSpPr>
+        <p:spPr>
+          <a:xfrm>
+            <a:off x="221942" y="5902000"/>
+            <a:ext cx="11748116" cy="923330"/>
+          </a:xfrm>
+          <a:prstGeom prst="rect">
+            <a:avLst/>
+          </a:prstGeom>
+          <a:noFill/>
+          <a:ln>
+            <a:solidFill>
+              <a:schemeClr val="bg2"/>
+            </a:solidFill>
+          </a:ln>
+        </p:spPr>
+        <p:txBody>
+          <a:bodyPr wrap="square" rtlCol="0">
+            <a:spAutoFit/>
+          </a:bodyPr>
+          <a:lstStyle/>
+          <a:p>
+            <a:r>
+              <a:rPr lang="en-US" i="1" dirty="0"/>
+              <a:t>*This chart shows the results of Best Subset Selection. Number of features is shown on the left, with the selected features being represented by their respective names and whether they were present in the results of each test. This was completed in an attempt  to maximize adjusted R^2. 5 features allowed for the optimal(maximum) result.</a:t>
+            </a:r>
+          </a:p>
+        </p:txBody>
+      </p:sp>
       <p:pic>
         <p:nvPicPr>
-          <p:cNvPr id="7" name="Picture 6">
+          <p:cNvPr id="15" name="Picture 14">
             <a:extLst>
               <a:ext uri="{FF2B5EF4-FFF2-40B4-BE49-F238E27FC236}">
-                <a16:creationId xmlns:a16="http://schemas.microsoft.com/office/drawing/2014/main" id="{60F02CCD-44DA-438B-9EA9-2038669A02D6}"/>
+                <a16:creationId xmlns:a16="http://schemas.microsoft.com/office/drawing/2014/main" id="{E78F6269-B70C-8A88-0E0D-175215D189FF}"/>
               </a:ext>
             </a:extLst>
           </p:cNvPr>
@@ -5554,8 +5586,8 @@
         </p:blipFill>
         <p:spPr>
           <a:xfrm>
-            <a:off x="0" y="3841699"/>
-            <a:ext cx="12192000" cy="2657231"/>
+            <a:off x="0" y="3673976"/>
+            <a:ext cx="12192000" cy="2066820"/>
           </a:xfrm>
           <a:prstGeom prst="rect">
             <a:avLst/>
@@ -5648,9 +5680,16 @@
             <p:ph idx="1"/>
           </p:nvPr>
         </p:nvSpPr>
-        <p:spPr/>
-        <p:txBody>
-          <a:bodyPr/>
+        <p:spPr>
+          <a:xfrm>
+            <a:off x="609600" y="1935479"/>
+            <a:ext cx="10972800" cy="4817745"/>
+          </a:xfrm>
+        </p:spPr>
+        <p:txBody>
+          <a:bodyPr>
+            <a:normAutofit fontScale="92500"/>
+          </a:bodyPr>
           <a:lstStyle/>
           <a:p>
             <a:r>
@@ -5679,7 +5718,13 @@
           <a:p>
             <a:r>
               <a:rPr lang="en-US" dirty="0"/>
-              <a:t>2 models were chosen as they were both optimal but based on different criteria</a:t>
+              <a:t>3 models were optimal but for different categories.</a:t>
+            </a:r>
+          </a:p>
+          <a:p>
+            <a:r>
+              <a:rPr lang="en-US" dirty="0"/>
+              <a:t>Multinomial Logistic Regression and Linear Discriminant Analysis were chosen due to their higher accuracy rates and due to having a lower cost differential, which is being prioritized over weight differential.</a:t>
             </a:r>
           </a:p>
           <a:p>
@@ -5689,10 +5734,10 @@
       </p:sp>
       <p:pic>
         <p:nvPicPr>
-          <p:cNvPr id="5" name="Picture 4">
+          <p:cNvPr id="6" name="Picture 5">
             <a:extLst>
               <a:ext uri="{FF2B5EF4-FFF2-40B4-BE49-F238E27FC236}">
-                <a16:creationId xmlns:a16="http://schemas.microsoft.com/office/drawing/2014/main" id="{70A493C0-2EC9-4FAD-A6FB-C0D3FF06DAAF}"/>
+                <a16:creationId xmlns:a16="http://schemas.microsoft.com/office/drawing/2014/main" id="{7D27A103-44D0-CD2E-A7BA-6E57905BB73E}"/>
               </a:ext>
             </a:extLst>
           </p:cNvPr>
@@ -5709,8 +5754,8 @@
         </p:blipFill>
         <p:spPr>
           <a:xfrm>
-            <a:off x="0" y="2397583"/>
-            <a:ext cx="12192000" cy="2613330"/>
+            <a:off x="1247776" y="2323922"/>
+            <a:ext cx="8629650" cy="2753233"/>
           </a:xfrm>
           <a:prstGeom prst="rect">
             <a:avLst/>
@@ -5775,9 +5820,16 @@
             <p:ph type="title"/>
           </p:nvPr>
         </p:nvSpPr>
-        <p:spPr/>
-        <p:txBody>
-          <a:bodyPr/>
+        <p:spPr>
+          <a:xfrm>
+            <a:off x="609600" y="704088"/>
+            <a:ext cx="10972800" cy="1143000"/>
+          </a:xfrm>
+        </p:spPr>
+        <p:txBody>
+          <a:bodyPr anchor="b">
+            <a:normAutofit/>
+          </a:bodyPr>
           <a:lstStyle/>
           <a:p>
             <a:r>
@@ -5800,12 +5852,19 @@
             <a:spLocks noGrp="1"/>
           </p:cNvSpPr>
           <p:nvPr>
-            <p:ph idx="1"/>
-          </p:nvPr>
-        </p:nvSpPr>
-        <p:spPr/>
-        <p:txBody>
-          <a:bodyPr/>
+            <p:ph sz="half" idx="1"/>
+          </p:nvPr>
+        </p:nvSpPr>
+        <p:spPr>
+          <a:xfrm>
+            <a:off x="609599" y="1920085"/>
+            <a:ext cx="10639425" cy="4434840"/>
+          </a:xfrm>
+        </p:spPr>
+        <p:txBody>
+          <a:bodyPr>
+            <a:normAutofit/>
+          </a:bodyPr>
           <a:lstStyle/>
           <a:p>
             <a:r>
@@ -5827,23 +5886,27 @@
           </a:p>
           <a:p>
             <a:pPr lvl="1"/>
-            <a:r>
-              <a:rPr lang="en-US" dirty="0"/>
+            <a:endParaRPr lang="en-US" sz="2600" dirty="0"/>
+          </a:p>
+          <a:p>
+            <a:pPr lvl="1"/>
+            <a:r>
+              <a:rPr lang="en-US" sz="2600" dirty="0"/>
               <a:t>The results on the test dataset indicated strong results on all three measures and by both models.</a:t>
             </a:r>
           </a:p>
           <a:p>
             <a:pPr lvl="1"/>
-            <a:endParaRPr lang="en-US" dirty="0"/>
+            <a:endParaRPr lang="en-US" sz="2600" dirty="0"/>
           </a:p>
         </p:txBody>
       </p:sp>
       <p:pic>
         <p:nvPicPr>
-          <p:cNvPr id="5" name="Picture 4">
+          <p:cNvPr id="8" name="Picture 7">
             <a:extLst>
               <a:ext uri="{FF2B5EF4-FFF2-40B4-BE49-F238E27FC236}">
-                <a16:creationId xmlns:a16="http://schemas.microsoft.com/office/drawing/2014/main" id="{8D479BE6-D983-485B-9E4F-AA18C408EE6A}"/>
+                <a16:creationId xmlns:a16="http://schemas.microsoft.com/office/drawing/2014/main" id="{5CE43B43-5AE0-86F5-2010-038805230E5B}"/>
               </a:ext>
             </a:extLst>
           </p:cNvPr>
@@ -5860,8 +5923,8 @@
         </p:blipFill>
         <p:spPr>
           <a:xfrm>
-            <a:off x="0" y="2919050"/>
-            <a:ext cx="12192000" cy="1019899"/>
+            <a:off x="609600" y="2395441"/>
+            <a:ext cx="11085138" cy="2128934"/>
           </a:xfrm>
           <a:prstGeom prst="rect">
             <a:avLst/>
@@ -5961,21 +6024,21 @@
           <a:p>
             <a:r>
               <a:rPr lang="en-US" dirty="0"/>
-              <a:t>Multinomial Logistic Regression and K-Nearest Neighbors were the most accurate when making predictions on bean types based on the morphometric measurement features</a:t>
+              <a:t>Multinomial Logistic Regression and Linear Discriminant Analysis were chosen as the most optimal when making predictions on bean types based on the morphometric measurement features</a:t>
             </a:r>
           </a:p>
           <a:p>
             <a:pPr lvl="1"/>
             <a:r>
               <a:rPr lang="en-US" dirty="0"/>
-              <a:t>Both had accuracy rates of over 98% on the validation and test datasets</a:t>
+              <a:t>Both had accuracy rates of over 87% on the validation and test datasets, with Multinomial Logistic  Regression having an accuracy rate of over 91%</a:t>
             </a:r>
           </a:p>
           <a:p>
             <a:pPr lvl="1"/>
             <a:r>
               <a:rPr lang="en-US" dirty="0"/>
-              <a:t>Both also had the lowest weight differential and cost differential respectively compared to the other models when tested on the validation dataset</a:t>
+              <a:t>Linear Discriminant Analysis had the lowest cost differential when compared to the other models</a:t>
             </a:r>
           </a:p>
           <a:p>

</xml_diff>

<commit_message>
Updates to R Seed Classification Project.
</commit_message>
<xml_diff>
--- a/R/STAT 602 - Applied Statistics II/Classification Project Seeds/Midterm Project - Gavin Gunawardena.pptx
+++ b/R/STAT 602 - Applied Statistics II/Classification Project Seeds/Midterm Project - Gavin Gunawardena.pptx
@@ -214,7 +214,7 @@
           <a:p>
             <a:fld id="{71BD4573-58E7-4156-A133-2731F5F8D1A6}" type="datetimeFigureOut">
               <a:rPr lang="en-US" smtClean="0"/>
-              <a:t>8/12/2022</a:t>
+              <a:t>9/5/2022</a:t>
             </a:fld>
             <a:endParaRPr lang="en-US"/>
           </a:p>
@@ -879,7 +879,7 @@
           <a:p>
             <a:fld id="{021A1D30-C0A0-4124-A783-34D9F15FA0FE}" type="datetime1">
               <a:rPr lang="en-US" smtClean="0"/>
-              <a:t>8/12/2022</a:t>
+              <a:t>9/5/2022</a:t>
             </a:fld>
             <a:endParaRPr lang="en-US"/>
           </a:p>
@@ -1063,7 +1063,7 @@
           <a:p>
             <a:fld id="{8D2D5871-AB0F-4B3D-8861-97E78CB7B47E}" type="datetime1">
               <a:rPr lang="en-US" smtClean="0"/>
-              <a:t>8/12/2022</a:t>
+              <a:t>9/5/2022</a:t>
             </a:fld>
             <a:endParaRPr lang="en-US"/>
           </a:p>
@@ -1257,7 +1257,7 @@
           <a:p>
             <a:fld id="{14418406-4C3F-4F3E-80BD-A22568EA37EB}" type="datetime1">
               <a:rPr lang="en-US" smtClean="0"/>
-              <a:t>8/12/2022</a:t>
+              <a:t>9/5/2022</a:t>
             </a:fld>
             <a:endParaRPr lang="en-US"/>
           </a:p>
@@ -1441,7 +1441,7 @@
           <a:p>
             <a:fld id="{65F28077-7188-48C5-8679-2287FAC952E9}" type="datetime1">
               <a:rPr lang="en-US" smtClean="0"/>
-              <a:t>8/12/2022</a:t>
+              <a:t>9/5/2022</a:t>
             </a:fld>
             <a:endParaRPr lang="en-US"/>
           </a:p>
@@ -1688,7 +1688,7 @@
           <a:p>
             <a:fld id="{D2DCB740-6776-4EE9-99FD-96D592FA5A23}" type="datetime1">
               <a:rPr lang="en-US" smtClean="0"/>
-              <a:t>8/12/2022</a:t>
+              <a:t>9/5/2022</a:t>
             </a:fld>
             <a:endParaRPr lang="en-US"/>
           </a:p>
@@ -1971,7 +1971,7 @@
           <a:p>
             <a:fld id="{05F6BD99-6FFD-46C5-B5E2-43A34BDA2566}" type="datetime1">
               <a:rPr lang="en-US" smtClean="0"/>
-              <a:t>8/12/2022</a:t>
+              <a:t>9/5/2022</a:t>
             </a:fld>
             <a:endParaRPr lang="en-US"/>
           </a:p>
@@ -2368,7 +2368,7 @@
           <a:p>
             <a:fld id="{E022678E-214C-4CF8-97C7-95015FB02960}" type="datetime1">
               <a:rPr lang="en-US" smtClean="0"/>
-              <a:t>8/12/2022</a:t>
+              <a:t>9/5/2022</a:t>
             </a:fld>
             <a:endParaRPr lang="en-US"/>
           </a:p>
@@ -2537,7 +2537,7 @@
           <a:p>
             <a:fld id="{D55660E0-FA77-4473-A859-74127B089143}" type="datetime1">
               <a:rPr lang="en-US" smtClean="0"/>
-              <a:t>8/12/2022</a:t>
+              <a:t>9/5/2022</a:t>
             </a:fld>
             <a:endParaRPr lang="en-US"/>
           </a:p>
@@ -2647,7 +2647,7 @@
           <a:p>
             <a:fld id="{3188D7B8-9F07-4899-827D-5F3CFDDEB574}" type="datetime1">
               <a:rPr lang="en-US" smtClean="0"/>
-              <a:t>8/12/2022</a:t>
+              <a:t>9/5/2022</a:t>
             </a:fld>
             <a:endParaRPr lang="en-US"/>
           </a:p>
@@ -2927,7 +2927,7 @@
           <a:p>
             <a:fld id="{B5197C5C-1CD1-417D-A89C-14747F5222C7}" type="datetime1">
               <a:rPr lang="en-US" smtClean="0"/>
-              <a:t>8/12/2022</a:t>
+              <a:t>9/5/2022</a:t>
             </a:fld>
             <a:endParaRPr lang="en-US"/>
           </a:p>
@@ -3280,7 +3280,7 @@
           <a:p>
             <a:fld id="{1359EFBB-CFA1-4AA8-9123-F0B52DBD84FE}" type="datetime1">
               <a:rPr lang="en-US" smtClean="0"/>
-              <a:t>8/12/2022</a:t>
+              <a:t>9/5/2022</a:t>
             </a:fld>
             <a:endParaRPr lang="en-US"/>
           </a:p>
@@ -4314,7 +4314,7 @@
             <a:fld id="{61146459-E3C3-4969-9224-5ED50B492D17}" type="datetime1">
               <a:rPr lang="en-US" smtClean="0"/>
               <a:pPr/>
-              <a:t>8/12/2022</a:t>
+              <a:t>9/5/2022</a:t>
             </a:fld>
             <a:endParaRPr lang="en-US" dirty="0"/>
           </a:p>
@@ -5373,7 +5373,15 @@
             <a:pPr lvl="1"/>
             <a:r>
               <a:rPr lang="en-US" dirty="0"/>
-              <a:t>Dataset was reduced from 3000 observations to 2731</a:t>
+              <a:t>Dataset was reduced from 3000 observations to 2731 </a:t>
+            </a:r>
+            <a:r>
+              <a:rPr lang="en-US"/>
+              <a:t>but bolstered </a:t>
+            </a:r>
+            <a:r>
+              <a:rPr lang="en-US" dirty="0"/>
+              <a:t>back to 3000 via oversampling minority datasets:</a:t>
             </a:r>
           </a:p>
         </p:txBody>
@@ -5400,14 +5408,88 @@
         </p:blipFill>
         <p:spPr>
           <a:xfrm>
-            <a:off x="1291466" y="2963975"/>
-            <a:ext cx="6007692" cy="3360625"/>
+            <a:off x="1291467" y="3429000"/>
+            <a:ext cx="4194933" cy="2346591"/>
           </a:xfrm>
           <a:prstGeom prst="rect">
             <a:avLst/>
           </a:prstGeom>
         </p:spPr>
       </p:pic>
+      <p:pic>
+        <p:nvPicPr>
+          <p:cNvPr id="7" name="Picture 6">
+            <a:extLst>
+              <a:ext uri="{FF2B5EF4-FFF2-40B4-BE49-F238E27FC236}">
+                <a16:creationId xmlns:a16="http://schemas.microsoft.com/office/drawing/2014/main" id="{652947BF-3490-0489-9348-84B38075D82D}"/>
+              </a:ext>
+            </a:extLst>
+          </p:cNvPr>
+          <p:cNvPicPr>
+            <a:picLocks noChangeAspect="1"/>
+          </p:cNvPicPr>
+          <p:nvPr/>
+        </p:nvPicPr>
+        <p:blipFill>
+          <a:blip r:embed="rId3"/>
+          <a:stretch>
+            <a:fillRect/>
+          </a:stretch>
+        </p:blipFill>
+        <p:spPr>
+          <a:xfrm>
+            <a:off x="6933126" y="3380012"/>
+            <a:ext cx="4379495" cy="2444566"/>
+          </a:xfrm>
+          <a:prstGeom prst="rect">
+            <a:avLst/>
+          </a:prstGeom>
+        </p:spPr>
+      </p:pic>
+      <p:sp>
+        <p:nvSpPr>
+          <p:cNvPr id="8" name="Arrow: Right 7">
+            <a:extLst>
+              <a:ext uri="{FF2B5EF4-FFF2-40B4-BE49-F238E27FC236}">
+                <a16:creationId xmlns:a16="http://schemas.microsoft.com/office/drawing/2014/main" id="{632E3445-4A27-2B4E-DFA0-7B10F4C2F786}"/>
+              </a:ext>
+            </a:extLst>
+          </p:cNvPr>
+          <p:cNvSpPr/>
+          <p:nvPr/>
+        </p:nvSpPr>
+        <p:spPr>
+          <a:xfrm>
+            <a:off x="5628443" y="4130040"/>
+            <a:ext cx="1225118" cy="539614"/>
+          </a:xfrm>
+          <a:prstGeom prst="rightArrow">
+            <a:avLst/>
+          </a:prstGeom>
+        </p:spPr>
+        <p:style>
+          <a:lnRef idx="1">
+            <a:schemeClr val="accent3"/>
+          </a:lnRef>
+          <a:fillRef idx="2">
+            <a:schemeClr val="accent3"/>
+          </a:fillRef>
+          <a:effectRef idx="1">
+            <a:schemeClr val="accent3"/>
+          </a:effectRef>
+          <a:fontRef idx="minor">
+            <a:schemeClr val="dk1"/>
+          </a:fontRef>
+        </p:style>
+        <p:txBody>
+          <a:bodyPr rtlCol="0" anchor="ctr"/>
+          <a:lstStyle/>
+          <a:p>
+            <a:pPr algn="ctr"/>
+            <a:endParaRPr lang="en-US"/>
+          </a:p>
+        </p:txBody>
+      </p:sp>
     </p:spTree>
     <p:extLst>
       <p:ext uri="{BB962C8B-B14F-4D97-AF65-F5344CB8AC3E}">

</xml_diff>